<commit_message>
PPT is updated with TestNG latest report
</commit_message>
<xml_diff>
--- a/PPT/Group 5 AXIS QA Capstone Project.pptx
+++ b/PPT/Group 5 AXIS QA Capstone Project.pptx
@@ -4861,7 +4861,7 @@
           </a:xfrm>
         </p:spPr>
         <p:txBody>
-          <a:bodyPr>
+          <a:bodyPr anchor="ctr">
             <a:normAutofit/>
           </a:bodyPr>
           <a:lstStyle/>
@@ -4957,7 +4957,7 @@
           <a:p>
             <a:pPr>
               <a:lnSpc>
-                <a:spcPct val="150000"/>
+                <a:spcPct val="120000"/>
               </a:lnSpc>
             </a:pPr>
             <a:r>
@@ -4968,7 +4968,7 @@
           <a:p>
             <a:pPr>
               <a:lnSpc>
-                <a:spcPct val="150000"/>
+                <a:spcPct val="120000"/>
               </a:lnSpc>
             </a:pPr>
             <a:r>
@@ -4979,7 +4979,7 @@
           <a:p>
             <a:pPr lvl="1">
               <a:lnSpc>
-                <a:spcPct val="150000"/>
+                <a:spcPct val="120000"/>
               </a:lnSpc>
             </a:pPr>
             <a:r>
@@ -4990,7 +4990,7 @@
           <a:p>
             <a:pPr lvl="1">
               <a:lnSpc>
-                <a:spcPct val="150000"/>
+                <a:spcPct val="120000"/>
               </a:lnSpc>
             </a:pPr>
             <a:r>
@@ -5001,7 +5001,7 @@
           <a:p>
             <a:pPr lvl="1">
               <a:lnSpc>
-                <a:spcPct val="150000"/>
+                <a:spcPct val="120000"/>
               </a:lnSpc>
             </a:pPr>
             <a:r>
@@ -5012,18 +5012,29 @@
           <a:p>
             <a:pPr>
               <a:lnSpc>
-                <a:spcPct val="150000"/>
+                <a:spcPct val="120000"/>
               </a:lnSpc>
             </a:pPr>
             <a:r>
               <a:rPr lang="en-US" dirty="0"/>
-              <a:t>Tech Stack</a:t>
+              <a:t>Additional Case Study</a:t>
             </a:r>
           </a:p>
           <a:p>
             <a:pPr>
               <a:lnSpc>
-                <a:spcPct val="150000"/>
+                <a:spcPct val="120000"/>
+              </a:lnSpc>
+            </a:pPr>
+            <a:r>
+              <a:rPr lang="en-US" dirty="0"/>
+              <a:t>Tools Stack</a:t>
+            </a:r>
+          </a:p>
+          <a:p>
+            <a:pPr>
+              <a:lnSpc>
+                <a:spcPct val="120000"/>
               </a:lnSpc>
             </a:pPr>
             <a:r>
@@ -5055,7 +5066,7 @@
           <a:lstStyle/>
           <a:p>
             <a:r>
-              <a:rPr lang="en-IN"/>
+              <a:rPr lang="en-IN" dirty="0"/>
               <a:t>AXIS QA PROGRAM</a:t>
             </a:r>
           </a:p>
@@ -6270,7 +6281,7 @@
             </a:r>
           </a:p>
           <a:p>
-            <a:pPr lvl="1">
+            <a:pPr lvl="2">
               <a:lnSpc>
                 <a:spcPct val="150000"/>
               </a:lnSpc>
@@ -6281,7 +6292,7 @@
             </a:r>
           </a:p>
           <a:p>
-            <a:pPr lvl="1">
+            <a:pPr lvl="2">
               <a:lnSpc>
                 <a:spcPct val="150000"/>
               </a:lnSpc>
@@ -7192,8 +7203,8 @@
         </p:blipFill>
         <p:spPr>
           <a:xfrm>
-            <a:off x="1558156" y="2042480"/>
-            <a:ext cx="8890851" cy="3822919"/>
+            <a:off x="2479092" y="2042480"/>
+            <a:ext cx="7048979" cy="3822919"/>
           </a:xfrm>
           <a:prstGeom prst="rect">
             <a:avLst/>
@@ -7223,7 +7234,7 @@
           <a:p>
             <a:r>
               <a:rPr lang="en-US" dirty="0"/>
-              <a:t>Extra Project</a:t>
+              <a:t>Extra Case Study</a:t>
             </a:r>
           </a:p>
         </p:txBody>
@@ -7251,7 +7262,7 @@
           <a:p>
             <a:r>
               <a:rPr lang="en-US" dirty="0"/>
-              <a:t>Primary objective: Test and ensure the correct functionality of GlobalSQA Banking Project</a:t>
+              <a:t>Primary objective: Test and ensure the correct functionality of GlobalsQA Banking Project</a:t>
             </a:r>
           </a:p>
           <a:p>
@@ -8770,7 +8781,7 @@
           <a:p>
             <a:r>
               <a:rPr lang="en-US" dirty="0"/>
-              <a:t>TECH STACK</a:t>
+              <a:t>Tools Stack</a:t>
             </a:r>
           </a:p>
         </p:txBody>

</xml_diff>

<commit_message>
Github link added in PPT
</commit_message>
<xml_diff>
--- a/PPT/Group 5 AXIS QA Capstone Project.pptx
+++ b/PPT/Group 5 AXIS QA Capstone Project.pptx
@@ -5,7 +5,7 @@
     <p:sldMasterId id="2147483811" r:id="rId1"/>
   </p:sldMasterIdLst>
   <p:notesMasterIdLst>
-    <p:notesMasterId r:id="rId13"/>
+    <p:notesMasterId r:id="rId14"/>
   </p:notesMasterIdLst>
   <p:sldIdLst>
     <p:sldId id="269" r:id="rId2"/>
@@ -18,7 +18,8 @@
     <p:sldId id="283" r:id="rId9"/>
     <p:sldId id="282" r:id="rId10"/>
     <p:sldId id="277" r:id="rId11"/>
-    <p:sldId id="278" r:id="rId12"/>
+    <p:sldId id="284" r:id="rId12"/>
+    <p:sldId id="278" r:id="rId13"/>
   </p:sldIdLst>
   <p:sldSz cx="12192000" cy="6858000"/>
   <p:notesSz cx="6858000" cy="9144000"/>
@@ -207,7 +208,7 @@
           <a:p>
             <a:fld id="{16506ED6-2DF0-49E2-97E7-D1F8759B3764}" type="datetimeFigureOut">
               <a:rPr lang="en-IN" smtClean="0"/>
-              <a:t>11/11/24</a:t>
+              <a:t>12/11/24</a:t>
             </a:fld>
             <a:endParaRPr lang="en-IN"/>
           </a:p>
@@ -720,7 +721,7 @@
           <a:p>
             <a:fld id="{20FA436C-7566-4675-9B14-3F68C57E39BC}" type="datetime1">
               <a:rPr lang="en-IN" smtClean="0"/>
-              <a:t>11/11/24</a:t>
+              <a:t>12/11/24</a:t>
             </a:fld>
             <a:endParaRPr lang="en-IN"/>
           </a:p>
@@ -985,7 +986,7 @@
           <a:p>
             <a:fld id="{0F13FE41-143A-4941-A979-3604C4516226}" type="datetime1">
               <a:rPr lang="en-IN" smtClean="0"/>
-              <a:t>11/11/24</a:t>
+              <a:t>12/11/24</a:t>
             </a:fld>
             <a:endParaRPr lang="en-IN"/>
           </a:p>
@@ -1223,7 +1224,7 @@
           <a:p>
             <a:fld id="{BFCA4425-BCF4-4E71-8C1A-0BC692282585}" type="datetime1">
               <a:rPr lang="en-IN" smtClean="0"/>
-              <a:t>11/11/24</a:t>
+              <a:t>12/11/24</a:t>
             </a:fld>
             <a:endParaRPr lang="en-IN"/>
           </a:p>
@@ -1466,7 +1467,7 @@
           <a:p>
             <a:fld id="{444BE9F0-3B2F-436C-8F68-4EA9F89DC876}" type="datetime1">
               <a:rPr lang="en-IN" smtClean="0"/>
-              <a:t>11/11/24</a:t>
+              <a:t>12/11/24</a:t>
             </a:fld>
             <a:endParaRPr lang="en-IN"/>
           </a:p>
@@ -1776,7 +1777,7 @@
           <a:p>
             <a:fld id="{A1364814-E220-4C66-8B74-8096B12B13AC}" type="datetime1">
               <a:rPr lang="en-IN" smtClean="0"/>
-              <a:t>11/11/24</a:t>
+              <a:t>12/11/24</a:t>
             </a:fld>
             <a:endParaRPr lang="en-IN"/>
           </a:p>
@@ -2081,7 +2082,7 @@
           <a:p>
             <a:fld id="{999F03C6-B00F-4B4A-9AA4-4CC1824BF551}" type="datetime1">
               <a:rPr lang="en-IN" smtClean="0"/>
-              <a:t>11/11/24</a:t>
+              <a:t>12/11/24</a:t>
             </a:fld>
             <a:endParaRPr lang="en-IN"/>
           </a:p>
@@ -2506,7 +2507,7 @@
           <a:p>
             <a:fld id="{AB5ED2EC-5372-41A5-9558-852DA428B672}" type="datetime1">
               <a:rPr lang="en-IN" smtClean="0"/>
-              <a:t>11/11/24</a:t>
+              <a:t>12/11/24</a:t>
             </a:fld>
             <a:endParaRPr lang="en-IN"/>
           </a:p>
@@ -2672,7 +2673,7 @@
           <a:p>
             <a:fld id="{5B8FB4DA-71E2-4120-AE5A-F9907FA7CEF6}" type="datetime1">
               <a:rPr lang="en-IN" smtClean="0"/>
-              <a:t>11/11/24</a:t>
+              <a:t>12/11/24</a:t>
             </a:fld>
             <a:endParaRPr lang="en-IN"/>
           </a:p>
@@ -2770,7 +2771,7 @@
           <a:p>
             <a:fld id="{80171D09-6D98-4AB3-BE74-7A55B4A0EDA0}" type="datetime1">
               <a:rPr lang="en-IN" smtClean="0"/>
-              <a:t>11/11/24</a:t>
+              <a:t>12/11/24</a:t>
             </a:fld>
             <a:endParaRPr lang="en-IN"/>
           </a:p>
@@ -3151,7 +3152,7 @@
           <a:p>
             <a:fld id="{1708777A-69C6-47D7-A5B4-B81A5B272AA6}" type="datetime1">
               <a:rPr lang="en-IN" smtClean="0"/>
-              <a:t>11/11/24</a:t>
+              <a:t>12/11/24</a:t>
             </a:fld>
             <a:endParaRPr lang="en-IN"/>
           </a:p>
@@ -3443,7 +3444,7 @@
           <a:p>
             <a:fld id="{AB5ED2EC-5372-41A5-9558-852DA428B672}" type="datetime1">
               <a:rPr lang="en-IN" smtClean="0"/>
-              <a:t>11/11/24</a:t>
+              <a:t>12/11/24</a:t>
             </a:fld>
             <a:endParaRPr lang="en-IN"/>
           </a:p>
@@ -3658,7 +3659,7 @@
           <a:p>
             <a:fld id="{AB5ED2EC-5372-41A5-9558-852DA428B672}" type="datetime1">
               <a:rPr lang="en-IN" smtClean="0"/>
-              <a:t>11/11/24</a:t>
+              <a:t>12/11/24</a:t>
             </a:fld>
             <a:endParaRPr lang="en-IN"/>
           </a:p>
@@ -4780,6 +4781,158 @@
 </file>
 
 <file path=ppt/slides/slide11.xml><?xml version="1.0" encoding="utf-8"?>
+<p:sld xmlns:a="http://schemas.openxmlformats.org/drawingml/2006/main" xmlns:r="http://schemas.openxmlformats.org/officeDocument/2006/relationships" xmlns:p="http://schemas.openxmlformats.org/presentationml/2006/main">
+  <p:cSld>
+    <p:spTree>
+      <p:nvGrpSpPr>
+        <p:cNvPr id="1" name=""/>
+        <p:cNvGrpSpPr/>
+        <p:nvPr/>
+      </p:nvGrpSpPr>
+      <p:grpSpPr>
+        <a:xfrm>
+          <a:off x="0" y="0"/>
+          <a:ext cx="0" cy="0"/>
+          <a:chOff x="0" y="0"/>
+          <a:chExt cx="0" cy="0"/>
+        </a:xfrm>
+      </p:grpSpPr>
+      <p:sp>
+        <p:nvSpPr>
+          <p:cNvPr id="2" name="Title 1">
+            <a:extLst>
+              <a:ext uri="{FF2B5EF4-FFF2-40B4-BE49-F238E27FC236}">
+                <a16:creationId xmlns:a16="http://schemas.microsoft.com/office/drawing/2014/main" id="{5A5C562D-9382-ED4C-BCB3-E314A9F37368}"/>
+              </a:ext>
+            </a:extLst>
+          </p:cNvPr>
+          <p:cNvSpPr>
+            <a:spLocks noGrp="1"/>
+          </p:cNvSpPr>
+          <p:nvPr>
+            <p:ph type="title"/>
+          </p:nvPr>
+        </p:nvSpPr>
+        <p:spPr/>
+        <p:txBody>
+          <a:bodyPr/>
+          <a:lstStyle/>
+          <a:p>
+            <a:r>
+              <a:rPr lang="en-US" dirty="0"/>
+              <a:t>Important </a:t>
+            </a:r>
+            <a:r>
+              <a:rPr lang="en-US" dirty="0" err="1"/>
+              <a:t>LinkS</a:t>
+            </a:r>
+            <a:endParaRPr lang="en-US" dirty="0"/>
+          </a:p>
+        </p:txBody>
+      </p:sp>
+      <p:sp>
+        <p:nvSpPr>
+          <p:cNvPr id="3" name="Content Placeholder 2">
+            <a:extLst>
+              <a:ext uri="{FF2B5EF4-FFF2-40B4-BE49-F238E27FC236}">
+                <a16:creationId xmlns:a16="http://schemas.microsoft.com/office/drawing/2014/main" id="{ED9F639F-90D6-FC4A-A4B2-90DB0C2E5D69}"/>
+              </a:ext>
+            </a:extLst>
+          </p:cNvPr>
+          <p:cNvSpPr>
+            <a:spLocks noGrp="1"/>
+          </p:cNvSpPr>
+          <p:nvPr>
+            <p:ph idx="1"/>
+          </p:nvPr>
+        </p:nvSpPr>
+        <p:spPr/>
+        <p:txBody>
+          <a:bodyPr/>
+          <a:lstStyle/>
+          <a:p>
+            <a:r>
+              <a:rPr lang="en-US" dirty="0"/>
+              <a:t>GitHub Link: </a:t>
+            </a:r>
+            <a:r>
+              <a:rPr lang="en-US" dirty="0">
+                <a:hlinkClick r:id="rId2"/>
+              </a:rPr>
+              <a:t>Axis Bank Case Studies Project</a:t>
+            </a:r>
+            <a:r>
+              <a:rPr lang="en-US" dirty="0"/>
+              <a:t> (</a:t>
+            </a:r>
+            <a:r>
+              <a:rPr lang="en-US" dirty="0">
+                <a:hlinkClick r:id="rId2"/>
+              </a:rPr>
+              <a:t>https://github.com/suyogwaghere/AxisBank_Case_Studies</a:t>
+            </a:r>
+            <a:r>
+              <a:rPr lang="en-US" dirty="0"/>
+              <a:t>)</a:t>
+            </a:r>
+          </a:p>
+          <a:p>
+            <a:r>
+              <a:rPr lang="en-US" dirty="0"/>
+              <a:t>GlobalsQA: </a:t>
+            </a:r>
+            <a:r>
+              <a:rPr lang="en-US" dirty="0">
+                <a:hlinkClick r:id="rId3"/>
+              </a:rPr>
+              <a:t>https://www.xyzbank.com</a:t>
+            </a:r>
+            <a:endParaRPr lang="en-US" dirty="0"/>
+          </a:p>
+        </p:txBody>
+      </p:sp>
+      <p:sp>
+        <p:nvSpPr>
+          <p:cNvPr id="4" name="Footer Placeholder 3">
+            <a:extLst>
+              <a:ext uri="{FF2B5EF4-FFF2-40B4-BE49-F238E27FC236}">
+                <a16:creationId xmlns:a16="http://schemas.microsoft.com/office/drawing/2014/main" id="{53976AFE-DE2B-234F-9C23-D77F6AA71D50}"/>
+              </a:ext>
+            </a:extLst>
+          </p:cNvPr>
+          <p:cNvSpPr>
+            <a:spLocks noGrp="1"/>
+          </p:cNvSpPr>
+          <p:nvPr>
+            <p:ph type="ftr" sz="quarter" idx="11"/>
+          </p:nvPr>
+        </p:nvSpPr>
+        <p:spPr/>
+        <p:txBody>
+          <a:bodyPr/>
+          <a:lstStyle/>
+          <a:p>
+            <a:r>
+              <a:rPr lang="en-IN"/>
+              <a:t>AXIS QA PROGRAM</a:t>
+            </a:r>
+          </a:p>
+        </p:txBody>
+      </p:sp>
+    </p:spTree>
+    <p:extLst>
+      <p:ext uri="{BB962C8B-B14F-4D97-AF65-F5344CB8AC3E}">
+        <p14:creationId xmlns:p14="http://schemas.microsoft.com/office/powerpoint/2010/main" val="1173770622"/>
+      </p:ext>
+    </p:extLst>
+  </p:cSld>
+  <p:clrMapOvr>
+    <a:masterClrMapping/>
+  </p:clrMapOvr>
+</p:sld>
+</file>
+
+<file path=ppt/slides/slide12.xml><?xml version="1.0" encoding="utf-8"?>
 <p:sld xmlns:a="http://schemas.openxmlformats.org/drawingml/2006/main" xmlns:r="http://schemas.openxmlformats.org/officeDocument/2006/relationships" xmlns:p="http://schemas.openxmlformats.org/presentationml/2006/main">
   <p:cSld>
     <p:spTree>

</xml_diff>